<commit_message>
Added presentations and examples for repository pattern
</commit_message>
<xml_diff>
--- a/Doc/Prezentace-uvod.pptx
+++ b/Doc/Prezentace-uvod.pptx
@@ -259,7 +259,7 @@
           <a:p>
             <a:fld id="{8725CDB3-0518-4E68-B4FF-B948AD6ADE2B}" type="datetimeFigureOut">
               <a:rPr lang="cs-CZ" smtClean="0"/>
-              <a:t>02.12.2015</a:t>
+              <a:t>05.12.2015</a:t>
             </a:fld>
             <a:endParaRPr lang="cs-CZ"/>
           </a:p>
@@ -429,7 +429,7 @@
           <a:p>
             <a:fld id="{8725CDB3-0518-4E68-B4FF-B948AD6ADE2B}" type="datetimeFigureOut">
               <a:rPr lang="cs-CZ" smtClean="0"/>
-              <a:t>02.12.2015</a:t>
+              <a:t>05.12.2015</a:t>
             </a:fld>
             <a:endParaRPr lang="cs-CZ"/>
           </a:p>
@@ -609,7 +609,7 @@
           <a:p>
             <a:fld id="{8725CDB3-0518-4E68-B4FF-B948AD6ADE2B}" type="datetimeFigureOut">
               <a:rPr lang="cs-CZ" smtClean="0"/>
-              <a:t>02.12.2015</a:t>
+              <a:t>05.12.2015</a:t>
             </a:fld>
             <a:endParaRPr lang="cs-CZ"/>
           </a:p>
@@ -779,7 +779,7 @@
           <a:p>
             <a:fld id="{8725CDB3-0518-4E68-B4FF-B948AD6ADE2B}" type="datetimeFigureOut">
               <a:rPr lang="cs-CZ" smtClean="0"/>
-              <a:t>02.12.2015</a:t>
+              <a:t>05.12.2015</a:t>
             </a:fld>
             <a:endParaRPr lang="cs-CZ"/>
           </a:p>
@@ -1030,7 +1030,7 @@
           <a:p>
             <a:fld id="{8725CDB3-0518-4E68-B4FF-B948AD6ADE2B}" type="datetimeFigureOut">
               <a:rPr lang="cs-CZ" smtClean="0"/>
-              <a:t>02.12.2015</a:t>
+              <a:t>05.12.2015</a:t>
             </a:fld>
             <a:endParaRPr lang="cs-CZ"/>
           </a:p>
@@ -1262,7 +1262,7 @@
           <a:p>
             <a:fld id="{8725CDB3-0518-4E68-B4FF-B948AD6ADE2B}" type="datetimeFigureOut">
               <a:rPr lang="cs-CZ" smtClean="0"/>
-              <a:t>02.12.2015</a:t>
+              <a:t>05.12.2015</a:t>
             </a:fld>
             <a:endParaRPr lang="cs-CZ"/>
           </a:p>
@@ -1609,7 +1609,7 @@
           <a:p>
             <a:fld id="{8725CDB3-0518-4E68-B4FF-B948AD6ADE2B}" type="datetimeFigureOut">
               <a:rPr lang="cs-CZ" smtClean="0"/>
-              <a:t>02.12.2015</a:t>
+              <a:t>05.12.2015</a:t>
             </a:fld>
             <a:endParaRPr lang="cs-CZ"/>
           </a:p>
@@ -1727,7 +1727,7 @@
           <a:p>
             <a:fld id="{8725CDB3-0518-4E68-B4FF-B948AD6ADE2B}" type="datetimeFigureOut">
               <a:rPr lang="cs-CZ" smtClean="0"/>
-              <a:t>02.12.2015</a:t>
+              <a:t>05.12.2015</a:t>
             </a:fld>
             <a:endParaRPr lang="cs-CZ"/>
           </a:p>
@@ -1845,7 +1845,7 @@
           <a:p>
             <a:fld id="{8725CDB3-0518-4E68-B4FF-B948AD6ADE2B}" type="datetimeFigureOut">
               <a:rPr lang="cs-CZ" smtClean="0"/>
-              <a:t>02.12.2015</a:t>
+              <a:t>05.12.2015</a:t>
             </a:fld>
             <a:endParaRPr lang="cs-CZ"/>
           </a:p>
@@ -2129,7 +2129,7 @@
           <a:p>
             <a:fld id="{8725CDB3-0518-4E68-B4FF-B948AD6ADE2B}" type="datetimeFigureOut">
               <a:rPr lang="cs-CZ" smtClean="0"/>
-              <a:t>02.12.2015</a:t>
+              <a:t>05.12.2015</a:t>
             </a:fld>
             <a:endParaRPr lang="cs-CZ"/>
           </a:p>
@@ -2393,7 +2393,7 @@
           <a:p>
             <a:fld id="{8725CDB3-0518-4E68-B4FF-B948AD6ADE2B}" type="datetimeFigureOut">
               <a:rPr lang="cs-CZ" smtClean="0"/>
-              <a:t>02.12.2015</a:t>
+              <a:t>05.12.2015</a:t>
             </a:fld>
             <a:endParaRPr lang="cs-CZ"/>
           </a:p>
@@ -2607,7 +2607,7 @@
           <a:p>
             <a:fld id="{8725CDB3-0518-4E68-B4FF-B948AD6ADE2B}" type="datetimeFigureOut">
               <a:rPr lang="cs-CZ" smtClean="0"/>
-              <a:t>02.12.2015</a:t>
+              <a:t>05.12.2015</a:t>
             </a:fld>
             <a:endParaRPr lang="cs-CZ"/>
           </a:p>
@@ -3039,7 +3039,7 @@
                 <a:latin typeface="Segoe UI" panose="020B0502040204020203" pitchFamily="34" charset="0"/>
                 <a:cs typeface="Segoe UI" panose="020B0502040204020203" pitchFamily="34" charset="0"/>
               </a:rPr>
-              <a:t>Entity Framework: Code First</a:t>
+              <a:t>Úvod do Entity Framework</a:t>
             </a:r>
             <a:endParaRPr lang="cs-CZ" sz="2400" dirty="0" smtClean="0">
               <a:solidFill>
@@ -3213,16 +3213,6 @@
               </a:rPr>
               <a:t>12/2015 PRAHA</a:t>
             </a:r>
-            <a:endParaRPr lang="cs-CZ" sz="1400" dirty="0" smtClean="0">
-              <a:solidFill>
-                <a:schemeClr val="tx1">
-                  <a:lumMod val="75000"/>
-                  <a:lumOff val="25000"/>
-                </a:schemeClr>
-              </a:solidFill>
-              <a:latin typeface="Segoe UI" panose="020B0502040204020203" pitchFamily="34" charset="0"/>
-              <a:cs typeface="Segoe UI" panose="020B0502040204020203" pitchFamily="34" charset="0"/>
-            </a:endParaRPr>
           </a:p>
         </p:txBody>
       </p:sp>
@@ -3284,11 +3274,11 @@
   <p:clrMapOvr>
     <a:masterClrMapping/>
   </p:clrMapOvr>
-  <mc:AlternateContent xmlns:mc="http://schemas.openxmlformats.org/markup-compatibility/2006">
-    <mc:Choice xmlns:p14="http://schemas.microsoft.com/office/powerpoint/2010/main" Requires="p14">
+  <mc:AlternateContent xmlns:mc="http://schemas.openxmlformats.org/markup-compatibility/2006" xmlns:p14="http://schemas.microsoft.com/office/powerpoint/2010/main">
+    <mc:Choice Requires="p14">
       <p:transition p14:dur="0"/>
     </mc:Choice>
-    <mc:Fallback>
+    <mc:Fallback xmlns="">
       <p:transition/>
     </mc:Fallback>
   </mc:AlternateContent>
@@ -4556,20 +4546,7 @@
                 <a:latin typeface="Segoe UI" panose="020B0502040204020203" pitchFamily="34" charset="0"/>
                 <a:cs typeface="Segoe UI" panose="020B0502040204020203" pitchFamily="34" charset="0"/>
               </a:rPr>
-              <a:t>na základě aplikačního kódu, včetně indexů a </a:t>
-            </a:r>
-            <a:r>
-              <a:rPr lang="cs-CZ" sz="2400" dirty="0" smtClean="0">
-                <a:solidFill>
-                  <a:schemeClr val="tx1">
-                    <a:lumMod val="75000"/>
-                    <a:lumOff val="25000"/>
-                  </a:schemeClr>
-                </a:solidFill>
-                <a:latin typeface="Segoe UI" panose="020B0502040204020203" pitchFamily="34" charset="0"/>
-                <a:cs typeface="Segoe UI" panose="020B0502040204020203" pitchFamily="34" charset="0"/>
-              </a:rPr>
-              <a:t>omezení</a:t>
+              <a:t>na základě aplikačního kódu, včetně indexů a omezení</a:t>
             </a:r>
           </a:p>
           <a:p>
@@ -4606,20 +4583,7 @@
                 <a:latin typeface="Segoe UI" panose="020B0502040204020203" pitchFamily="34" charset="0"/>
                 <a:cs typeface="Segoe UI" panose="020B0502040204020203" pitchFamily="34" charset="0"/>
               </a:rPr>
-              <a:t>Abstrakce </a:t>
-            </a:r>
-            <a:r>
-              <a:rPr lang="cs-CZ" sz="2400" dirty="0" smtClean="0">
-                <a:solidFill>
-                  <a:schemeClr val="tx1">
-                    <a:lumMod val="75000"/>
-                    <a:lumOff val="25000"/>
-                  </a:schemeClr>
-                </a:solidFill>
-                <a:latin typeface="Segoe UI" panose="020B0502040204020203" pitchFamily="34" charset="0"/>
-                <a:cs typeface="Segoe UI" panose="020B0502040204020203" pitchFamily="34" charset="0"/>
-              </a:rPr>
-              <a:t>databáze skrze </a:t>
+              <a:t>Abstrakce databáze skrze </a:t>
             </a:r>
             <a:r>
               <a:rPr lang="cs-CZ" sz="2400" dirty="0" err="1" smtClean="0">
@@ -4799,20 +4763,7 @@
                 <a:latin typeface="Segoe UI" panose="020B0502040204020203" pitchFamily="34" charset="0"/>
                 <a:cs typeface="Segoe UI" panose="020B0502040204020203" pitchFamily="34" charset="0"/>
               </a:rPr>
-              <a:t>, která probíhá už na úrovni </a:t>
-            </a:r>
-            <a:r>
-              <a:rPr lang="cs-CZ" sz="2400" dirty="0" smtClean="0">
-                <a:solidFill>
-                  <a:schemeClr val="tx1">
-                    <a:lumMod val="75000"/>
-                    <a:lumOff val="25000"/>
-                  </a:schemeClr>
-                </a:solidFill>
-                <a:latin typeface="Segoe UI" panose="020B0502040204020203" pitchFamily="34" charset="0"/>
-                <a:cs typeface="Segoe UI" panose="020B0502040204020203" pitchFamily="34" charset="0"/>
-              </a:rPr>
-              <a:t>aplikace</a:t>
+              <a:t>, která probíhá už na úrovni aplikace</a:t>
             </a:r>
           </a:p>
           <a:p>
@@ -4849,20 +4800,7 @@
                 <a:latin typeface="Segoe UI" panose="020B0502040204020203" pitchFamily="34" charset="0"/>
                 <a:cs typeface="Segoe UI" panose="020B0502040204020203" pitchFamily="34" charset="0"/>
               </a:rPr>
-              <a:t>Celá </a:t>
-            </a:r>
-            <a:r>
-              <a:rPr lang="cs-CZ" sz="2400" dirty="0" smtClean="0">
-                <a:solidFill>
-                  <a:schemeClr val="tx1">
-                    <a:lumMod val="75000"/>
-                    <a:lumOff val="25000"/>
-                  </a:schemeClr>
-                </a:solidFill>
-                <a:latin typeface="Segoe UI" panose="020B0502040204020203" pitchFamily="34" charset="0"/>
-                <a:cs typeface="Segoe UI" panose="020B0502040204020203" pitchFamily="34" charset="0"/>
-              </a:rPr>
-              <a:t>řada </a:t>
+              <a:t>Celá řada </a:t>
             </a:r>
             <a:r>
               <a:rPr lang="cs-CZ" sz="2400" dirty="0" smtClean="0">

</xml_diff>